<commit_message>
updated: uses my formal blog site name
</commit_message>
<xml_diff>
--- a/slides/2016/project_proposal_basic.pptx
+++ b/slides/2016/project_proposal_basic.pptx
@@ -5217,12 +5217,12 @@
         </a:fontRef>
       </dsp:style>
       <dsp:txBody>
-        <a:bodyPr spcFirstLastPara="0" vert="horz" wrap="square" lIns="13335" tIns="13335" rIns="13335" bIns="13335" numCol="1" spcCol="1270" anchor="ctr" anchorCtr="0">
+        <a:bodyPr spcFirstLastPara="0" vert="horz" wrap="square" lIns="13970" tIns="13970" rIns="13970" bIns="13970" numCol="1" spcCol="1270" anchor="ctr" anchorCtr="0">
           <a:noAutofit/>
         </a:bodyPr>
         <a:lstStyle/>
         <a:p>
-          <a:pPr lvl="0" algn="ctr" defTabSz="933450">
+          <a:pPr lvl="0" algn="ctr" defTabSz="977900">
             <a:lnSpc>
               <a:spcPct val="90000"/>
             </a:lnSpc>
@@ -5234,10 +5234,10 @@
             </a:spcAft>
           </a:pPr>
           <a:r>
-            <a:rPr lang="en-US" sz="2100" kern="1200" dirty="0" smtClean="0"/>
+            <a:rPr lang="en-US" sz="2200" kern="1200" dirty="0" smtClean="0"/>
             <a:t>Story</a:t>
           </a:r>
-          <a:endParaRPr lang="en-US" sz="2100" kern="1200" dirty="0"/>
+          <a:endParaRPr lang="en-US" sz="2200" kern="1200" dirty="0"/>
         </a:p>
       </dsp:txBody>
       <dsp:txXfrm rot="-5400000">
@@ -5371,12 +5371,12 @@
         </a:fontRef>
       </dsp:style>
       <dsp:txBody>
-        <a:bodyPr spcFirstLastPara="0" vert="horz" wrap="square" lIns="13335" tIns="13335" rIns="13335" bIns="13335" numCol="1" spcCol="1270" anchor="ctr" anchorCtr="0">
+        <a:bodyPr spcFirstLastPara="0" vert="horz" wrap="square" lIns="13970" tIns="13970" rIns="13970" bIns="13970" numCol="1" spcCol="1270" anchor="ctr" anchorCtr="0">
           <a:noAutofit/>
         </a:bodyPr>
         <a:lstStyle/>
         <a:p>
-          <a:pPr lvl="0" algn="ctr" defTabSz="933450">
+          <a:pPr lvl="0" algn="ctr" defTabSz="977900">
             <a:lnSpc>
               <a:spcPct val="90000"/>
             </a:lnSpc>
@@ -5388,10 +5388,10 @@
             </a:spcAft>
           </a:pPr>
           <a:r>
-            <a:rPr lang="en-US" sz="2100" kern="1200" dirty="0" smtClean="0"/>
+            <a:rPr lang="en-US" sz="2200" kern="1200" dirty="0" smtClean="0"/>
             <a:t>Idea</a:t>
           </a:r>
-          <a:endParaRPr lang="en-US" sz="2100" kern="1200" dirty="0"/>
+          <a:endParaRPr lang="en-US" sz="2200" kern="1200" dirty="0"/>
         </a:p>
       </dsp:txBody>
       <dsp:txXfrm rot="-5400000">
@@ -5525,12 +5525,12 @@
         </a:fontRef>
       </dsp:style>
       <dsp:txBody>
-        <a:bodyPr spcFirstLastPara="0" vert="horz" wrap="square" lIns="13335" tIns="13335" rIns="13335" bIns="13335" numCol="1" spcCol="1270" anchor="ctr" anchorCtr="0">
+        <a:bodyPr spcFirstLastPara="0" vert="horz" wrap="square" lIns="13970" tIns="13970" rIns="13970" bIns="13970" numCol="1" spcCol="1270" anchor="ctr" anchorCtr="0">
           <a:noAutofit/>
         </a:bodyPr>
         <a:lstStyle/>
         <a:p>
-          <a:pPr lvl="0" algn="ctr" defTabSz="933450">
+          <a:pPr lvl="0" algn="ctr" defTabSz="977900">
             <a:lnSpc>
               <a:spcPct val="90000"/>
             </a:lnSpc>
@@ -5542,10 +5542,10 @@
             </a:spcAft>
           </a:pPr>
           <a:r>
-            <a:rPr lang="en-US" sz="2100" kern="1200" dirty="0" smtClean="0"/>
+            <a:rPr lang="en-US" sz="2200" kern="1200" dirty="0" smtClean="0"/>
             <a:t>Metric</a:t>
           </a:r>
-          <a:endParaRPr lang="en-US" sz="2100" kern="1200" dirty="0"/>
+          <a:endParaRPr lang="en-US" sz="2200" kern="1200" dirty="0"/>
         </a:p>
       </dsp:txBody>
       <dsp:txXfrm rot="-5400000">
@@ -12691,7 +12691,7 @@
           <a:p>
             <a:fld id="{3E245039-6FDA-4706-994D-4E4B055AB9B0}" type="datetimeFigureOut">
               <a:rPr lang="en-US" smtClean="0"/>
-              <a:t>1/7/2016</a:t>
+              <a:t>2/7/16</a:t>
             </a:fld>
             <a:endParaRPr lang="en-US"/>
           </a:p>
@@ -13801,7 +13801,7 @@
             <a:fld id="{1D8BD707-D9CF-40AE-B4C6-C98DA3205C09}" type="datetimeFigureOut">
               <a:rPr lang="en-US" smtClean="0"/>
               <a:pPr/>
-              <a:t>1/7/2016</a:t>
+              <a:t>2/7/16</a:t>
             </a:fld>
             <a:endParaRPr lang="en-US"/>
           </a:p>
@@ -14672,7 +14672,7 @@
             <a:fld id="{1D8BD707-D9CF-40AE-B4C6-C98DA3205C09}" type="datetimeFigureOut">
               <a:rPr lang="en-US" smtClean="0"/>
               <a:pPr/>
-              <a:t>1/7/2016</a:t>
+              <a:t>2/7/16</a:t>
             </a:fld>
             <a:endParaRPr lang="en-US"/>
           </a:p>
@@ -14849,7 +14849,7 @@
             <a:fld id="{1D8BD707-D9CF-40AE-B4C6-C98DA3205C09}" type="datetimeFigureOut">
               <a:rPr lang="en-US" smtClean="0"/>
               <a:pPr/>
-              <a:t>1/7/2016</a:t>
+              <a:t>2/7/16</a:t>
             </a:fld>
             <a:endParaRPr lang="en-US"/>
           </a:p>
@@ -15021,7 +15021,7 @@
             <a:fld id="{1D8BD707-D9CF-40AE-B4C6-C98DA3205C09}" type="datetimeFigureOut">
               <a:rPr lang="en-US" smtClean="0"/>
               <a:pPr/>
-              <a:t>1/7/2016</a:t>
+              <a:t>2/7/16</a:t>
             </a:fld>
             <a:endParaRPr lang="en-US"/>
           </a:p>
@@ -15233,7 +15233,7 @@
             <a:fld id="{1D8BD707-D9CF-40AE-B4C6-C98DA3205C09}" type="datetimeFigureOut">
               <a:rPr lang="en-US" smtClean="0"/>
               <a:pPr/>
-              <a:t>1/7/2016</a:t>
+              <a:t>2/7/16</a:t>
             </a:fld>
             <a:endParaRPr lang="en-US"/>
           </a:p>
@@ -16049,7 +16049,7 @@
             <a:fld id="{1D8BD707-D9CF-40AE-B4C6-C98DA3205C09}" type="datetimeFigureOut">
               <a:rPr lang="en-US" smtClean="0"/>
               <a:pPr/>
-              <a:t>1/7/2016</a:t>
+              <a:t>2/7/16</a:t>
             </a:fld>
             <a:endParaRPr lang="en-US"/>
           </a:p>
@@ -16287,7 +16287,7 @@
             <a:fld id="{1D8BD707-D9CF-40AE-B4C6-C98DA3205C09}" type="datetimeFigureOut">
               <a:rPr lang="en-US" smtClean="0"/>
               <a:pPr/>
-              <a:t>1/7/2016</a:t>
+              <a:t>2/7/16</a:t>
             </a:fld>
             <a:endParaRPr lang="en-US"/>
           </a:p>
@@ -16612,7 +16612,7 @@
             <a:fld id="{1D8BD707-D9CF-40AE-B4C6-C98DA3205C09}" type="datetimeFigureOut">
               <a:rPr lang="en-US" smtClean="0"/>
               <a:pPr/>
-              <a:t>1/7/2016</a:t>
+              <a:t>2/7/16</a:t>
             </a:fld>
             <a:endParaRPr lang="en-US"/>
           </a:p>
@@ -16704,7 +16704,7 @@
             <a:fld id="{1D8BD707-D9CF-40AE-B4C6-C98DA3205C09}" type="datetimeFigureOut">
               <a:rPr lang="en-US" smtClean="0"/>
               <a:pPr/>
-              <a:t>1/7/2016</a:t>
+              <a:t>2/7/16</a:t>
             </a:fld>
             <a:endParaRPr lang="en-US"/>
           </a:p>
@@ -17223,7 +17223,7 @@
             <a:fld id="{1D8BD707-D9CF-40AE-B4C6-C98DA3205C09}" type="datetimeFigureOut">
               <a:rPr lang="en-US" smtClean="0"/>
               <a:pPr/>
-              <a:t>1/7/2016</a:t>
+              <a:t>2/7/16</a:t>
             </a:fld>
             <a:endParaRPr lang="en-US"/>
           </a:p>
@@ -17736,7 +17736,7 @@
             <a:fld id="{1D8BD707-D9CF-40AE-B4C6-C98DA3205C09}" type="datetimeFigureOut">
               <a:rPr lang="en-US" smtClean="0"/>
               <a:pPr/>
-              <a:t>1/7/2016</a:t>
+              <a:t>2/7/16</a:t>
             </a:fld>
             <a:endParaRPr lang="en-US"/>
           </a:p>
@@ -17983,7 +17983,7 @@
             <a:fld id="{1D8BD707-D9CF-40AE-B4C6-C98DA3205C09}" type="datetimeFigureOut">
               <a:rPr lang="en-US" smtClean="0"/>
               <a:pPr/>
-              <a:t>1/7/2016</a:t>
+              <a:t>2/7/16</a:t>
             </a:fld>
             <a:endParaRPr lang="en-US"/>
           </a:p>
@@ -18656,7 +18656,27 @@
             </a:r>
             <a:r>
               <a:rPr lang="en-US" dirty="0" smtClean="0"/>
-              <a:t>                                                        					https://yangoliver.github.io</a:t>
+              <a:t>                                                        				</a:t>
+            </a:r>
+            <a:r>
+              <a:rPr lang="en-US" smtClean="0"/>
+              <a:t>	</a:t>
+            </a:r>
+            <a:r>
+              <a:rPr lang="en-US" smtClean="0"/>
+              <a:t>           https</a:t>
+            </a:r>
+            <a:r>
+              <a:rPr lang="en-US" dirty="0" smtClean="0"/>
+              <a:t>:/</a:t>
+            </a:r>
+            <a:r>
+              <a:rPr lang="en-US" dirty="0" smtClean="0"/>
+              <a:t>/</a:t>
+            </a:r>
+            <a:r>
+              <a:rPr lang="en-US" dirty="0" err="1" smtClean="0"/>
+              <a:t>oliveryang.net</a:t>
             </a:r>
             <a:endParaRPr lang="en-US" dirty="0"/>
           </a:p>
@@ -18675,7 +18695,7 @@
   <p:timing>
     <p:tnLst>
       <p:par>
-        <p:cTn id="1" dur="indefinite" restart="never" nodeType="tmRoot"/>
+        <p:cTn xmlns:p14="http://schemas.microsoft.com/office/powerpoint/2010/main" id="1" dur="indefinite" restart="never" nodeType="tmRoot"/>
       </p:par>
     </p:tnLst>
   </p:timing>
@@ -18876,7 +18896,7 @@
   <p:timing>
     <p:tnLst>
       <p:par>
-        <p:cTn id="1" dur="indefinite" restart="never" nodeType="tmRoot"/>
+        <p:cTn xmlns:p14="http://schemas.microsoft.com/office/powerpoint/2010/main" id="1" dur="indefinite" restart="never" nodeType="tmRoot"/>
       </p:par>
     </p:tnLst>
   </p:timing>
@@ -19113,7 +19133,7 @@
   <p:timing>
     <p:tnLst>
       <p:par>
-        <p:cTn id="1" dur="indefinite" restart="never" nodeType="tmRoot"/>
+        <p:cTn xmlns:p14="http://schemas.microsoft.com/office/powerpoint/2010/main" id="1" dur="indefinite" restart="never" nodeType="tmRoot"/>
       </p:par>
     </p:tnLst>
   </p:timing>
@@ -19206,7 +19226,7 @@
   <p:timing>
     <p:tnLst>
       <p:par>
-        <p:cTn id="1" dur="indefinite" restart="never" nodeType="tmRoot"/>
+        <p:cTn xmlns:p14="http://schemas.microsoft.com/office/powerpoint/2010/main" id="1" dur="indefinite" restart="never" nodeType="tmRoot"/>
       </p:par>
     </p:tnLst>
   </p:timing>
@@ -19335,7 +19355,7 @@
   <p:timing>
     <p:tnLst>
       <p:par>
-        <p:cTn id="1" dur="indefinite" restart="never" nodeType="tmRoot"/>
+        <p:cTn xmlns:p14="http://schemas.microsoft.com/office/powerpoint/2010/main" id="1" dur="indefinite" restart="never" nodeType="tmRoot"/>
       </p:par>
     </p:tnLst>
   </p:timing>
@@ -20019,7 +20039,7 @@
   <p:timing>
     <p:tnLst>
       <p:par>
-        <p:cTn id="1" dur="indefinite" restart="never" nodeType="tmRoot">
+        <p:cTn xmlns:p14="http://schemas.microsoft.com/office/powerpoint/2010/main" id="1" dur="indefinite" restart="never" nodeType="tmRoot">
           <p:childTnLst>
             <p:seq concurrent="1" nextAc="seek">
               <p:cTn id="2" dur="indefinite" nodeType="mainSeq">
@@ -20269,7 +20289,7 @@
   <p:timing>
     <p:tnLst>
       <p:par>
-        <p:cTn id="1" dur="indefinite" restart="never" nodeType="tmRoot"/>
+        <p:cTn xmlns:p14="http://schemas.microsoft.com/office/powerpoint/2010/main" id="1" dur="indefinite" restart="never" nodeType="tmRoot"/>
       </p:par>
     </p:tnLst>
   </p:timing>
@@ -20908,7 +20928,7 @@
   <p:timing>
     <p:tnLst>
       <p:par>
-        <p:cTn id="1" dur="indefinite" restart="never" nodeType="tmRoot">
+        <p:cTn xmlns:p14="http://schemas.microsoft.com/office/powerpoint/2010/main" id="1" dur="indefinite" restart="never" nodeType="tmRoot">
           <p:childTnLst>
             <p:seq concurrent="1" nextAc="seek">
               <p:cTn id="2" dur="indefinite" nodeType="mainSeq">
@@ -21165,7 +21185,7 @@
   <p:timing>
     <p:tnLst>
       <p:par>
-        <p:cTn id="1" dur="indefinite" restart="never" nodeType="tmRoot"/>
+        <p:cTn xmlns:p14="http://schemas.microsoft.com/office/powerpoint/2010/main" id="1" dur="indefinite" restart="never" nodeType="tmRoot"/>
       </p:par>
     </p:tnLst>
   </p:timing>
@@ -21262,7 +21282,7 @@
   <p:timing>
     <p:tnLst>
       <p:par>
-        <p:cTn id="1" dur="indefinite" restart="never" nodeType="tmRoot"/>
+        <p:cTn xmlns:p14="http://schemas.microsoft.com/office/powerpoint/2010/main" id="1" dur="indefinite" restart="never" nodeType="tmRoot"/>
       </p:par>
     </p:tnLst>
   </p:timing>
@@ -21399,22 +21419,14 @@
             <a:pPr lvl="1"/>
             <a:r>
               <a:rPr lang="en-US" sz="6100" dirty="0" smtClean="0"/>
-              <a:t>Use </a:t>
-            </a:r>
-            <a:r>
-              <a:rPr lang="en-US" sz="6100" dirty="0" smtClean="0"/>
-              <a:t>Case Definition</a:t>
+              <a:t>Use Case Definition</a:t>
             </a:r>
           </a:p>
           <a:p>
             <a:pPr lvl="2"/>
             <a:r>
               <a:rPr lang="en-US" sz="6100" dirty="0" smtClean="0"/>
-              <a:t>Use </a:t>
-            </a:r>
-            <a:r>
-              <a:rPr lang="en-US" sz="6100" dirty="0" smtClean="0"/>
-              <a:t>case </a:t>
+              <a:t>Use case </a:t>
             </a:r>
             <a:r>
               <a:rPr lang="en-US" sz="6100" dirty="0"/>
@@ -21443,15 +21455,7 @@
             <a:pPr lvl="2"/>
             <a:r>
               <a:rPr lang="en-US" sz="6100" dirty="0" smtClean="0"/>
-              <a:t>Use </a:t>
-            </a:r>
-            <a:r>
-              <a:rPr lang="en-US" sz="6100" dirty="0" smtClean="0"/>
-              <a:t>case </a:t>
-            </a:r>
-            <a:r>
-              <a:rPr lang="en-US" sz="6100" dirty="0" smtClean="0"/>
-              <a:t>brief description</a:t>
+              <a:t>Use case brief description</a:t>
             </a:r>
           </a:p>
           <a:p>
@@ -21464,11 +21468,7 @@
           <a:p>
             <a:r>
               <a:rPr lang="en-US" sz="6400" dirty="0" smtClean="0"/>
-              <a:t>Market </a:t>
-            </a:r>
-            <a:r>
-              <a:rPr lang="en-US" sz="6400" dirty="0" smtClean="0"/>
-              <a:t>analysis – (optional for component proposal)</a:t>
+              <a:t>Market analysis – (optional for component proposal)</a:t>
             </a:r>
           </a:p>
           <a:p>
@@ -21482,31 +21482,7 @@
             <a:pPr lvl="1"/>
             <a:r>
               <a:rPr lang="en-US" sz="6400" dirty="0" smtClean="0"/>
-              <a:t>Who </a:t>
-            </a:r>
-            <a:r>
-              <a:rPr lang="en-US" sz="6400" dirty="0" smtClean="0"/>
-              <a:t>are</a:t>
-            </a:r>
-            <a:r>
-              <a:rPr lang="en-US" sz="6400" dirty="0" smtClean="0"/>
-              <a:t> </a:t>
-            </a:r>
-            <a:r>
-              <a:rPr lang="en-US" sz="6400" dirty="0" smtClean="0"/>
-              <a:t>the major </a:t>
-            </a:r>
-            <a:r>
-              <a:rPr lang="en-US" sz="6400" dirty="0" smtClean="0"/>
-              <a:t>competitors </a:t>
-            </a:r>
-            <a:r>
-              <a:rPr lang="en-US" sz="6400" dirty="0" smtClean="0"/>
-              <a:t>in the </a:t>
-            </a:r>
-            <a:r>
-              <a:rPr lang="en-US" sz="6400" dirty="0" smtClean="0"/>
-              <a:t>market</a:t>
+              <a:t>Who are the major competitors in the market</a:t>
             </a:r>
           </a:p>
           <a:p>
@@ -21519,11 +21495,7 @@
           <a:p>
             <a:r>
               <a:rPr lang="en-US" sz="6400" dirty="0" smtClean="0"/>
-              <a:t>Identify </a:t>
-            </a:r>
-            <a:r>
-              <a:rPr lang="en-US" sz="6400" dirty="0" smtClean="0"/>
-              <a:t>and get your core contributors, project sponsors or advocates</a:t>
+              <a:t>Identify and get your core contributors, project sponsors or advocates</a:t>
             </a:r>
           </a:p>
           <a:p>
@@ -21545,7 +21517,7 @@
   <p:timing>
     <p:tnLst>
       <p:par>
-        <p:cTn id="1" dur="indefinite" restart="never" nodeType="tmRoot"/>
+        <p:cTn xmlns:p14="http://schemas.microsoft.com/office/powerpoint/2010/main" id="1" dur="indefinite" restart="never" nodeType="tmRoot"/>
       </p:par>
     </p:tnLst>
   </p:timing>

</xml_diff>